<commit_message>
Add pass by value vs pass by reference slide
</commit_message>
<xml_diff>
--- a/pointers/Pointers & Pass by Value.pptx
+++ b/pointers/Pointers & Pass by Value.pptx
@@ -6,6 +6,7 @@
   </p:sldMasterIdLst>
   <p:sldIdLst>
     <p:sldId id="256" r:id="rId2"/>
+    <p:sldId id="257" r:id="rId3"/>
   </p:sldIdLst>
   <p:sldSz cx="12192000" cy="6858000"/>
   <p:notesSz cx="6858000" cy="9144000"/>
@@ -3456,6 +3457,283 @@
 </p:sld>
 </file>
 
+<file path=ppt/slides/slide2.xml><?xml version="1.0" encoding="utf-8"?>
+<p:sld xmlns:a="http://schemas.openxmlformats.org/drawingml/2006/main" xmlns:r="http://schemas.openxmlformats.org/officeDocument/2006/relationships" xmlns:p="http://schemas.openxmlformats.org/presentationml/2006/main">
+  <p:cSld>
+    <p:spTree>
+      <p:nvGrpSpPr>
+        <p:cNvPr id="1" name=""/>
+        <p:cNvGrpSpPr/>
+        <p:nvPr/>
+      </p:nvGrpSpPr>
+      <p:grpSpPr>
+        <a:xfrm>
+          <a:off x="0" y="0"/>
+          <a:ext cx="0" cy="0"/>
+          <a:chOff x="0" y="0"/>
+          <a:chExt cx="0" cy="0"/>
+        </a:xfrm>
+      </p:grpSpPr>
+      <p:sp>
+        <p:nvSpPr>
+          <p:cNvPr id="2" name="Title 1">
+            <a:extLst>
+              <a:ext uri="{FF2B5EF4-FFF2-40B4-BE49-F238E27FC236}">
+                <a16:creationId xmlns:a16="http://schemas.microsoft.com/office/drawing/2014/main" id="{32897EE3-5240-4E05-979D-70115A6F0CC4}"/>
+              </a:ext>
+            </a:extLst>
+          </p:cNvPr>
+          <p:cNvSpPr>
+            <a:spLocks noGrp="1"/>
+          </p:cNvSpPr>
+          <p:nvPr>
+            <p:ph type="title"/>
+          </p:nvPr>
+        </p:nvSpPr>
+        <p:spPr/>
+        <p:txBody>
+          <a:bodyPr/>
+          <a:lstStyle/>
+          <a:p>
+            <a:r>
+              <a:rPr lang="en-US" dirty="0"/>
+              <a:t>Why did the email not update in the last video?</a:t>
+            </a:r>
+          </a:p>
+        </p:txBody>
+      </p:sp>
+      <p:sp>
+        <p:nvSpPr>
+          <p:cNvPr id="3" name="TextBox 2">
+            <a:extLst>
+              <a:ext uri="{FF2B5EF4-FFF2-40B4-BE49-F238E27FC236}">
+                <a16:creationId xmlns:a16="http://schemas.microsoft.com/office/drawing/2014/main" id="{BA0629EF-C649-4676-A55B-6F336840E14E}"/>
+              </a:ext>
+            </a:extLst>
+          </p:cNvPr>
+          <p:cNvSpPr txBox="1"/>
+          <p:nvPr/>
+        </p:nvSpPr>
+        <p:spPr>
+          <a:xfrm>
+            <a:off x="3740728" y="754505"/>
+            <a:ext cx="7840608" cy="923330"/>
+          </a:xfrm>
+          <a:prstGeom prst="rect">
+            <a:avLst/>
+          </a:prstGeom>
+          <a:noFill/>
+        </p:spPr>
+        <p:txBody>
+          <a:bodyPr wrap="none" rtlCol="0">
+            <a:spAutoFit/>
+          </a:bodyPr>
+          <a:lstStyle/>
+          <a:p>
+            <a:r>
+              <a:rPr lang="en-US" dirty="0"/>
+              <a:t>Everything in go is pass by value</a:t>
+            </a:r>
+          </a:p>
+          <a:p>
+            <a:pPr marL="285750" indent="-285750">
+              <a:buFont typeface="Arial" panose="020B0604020202020204" pitchFamily="34" charset="0"/>
+              <a:buChar char="•"/>
+            </a:pPr>
+            <a:r>
+              <a:rPr lang="en-US" dirty="0"/>
+              <a:t>When updating the email for the person struct we are updating a copy of that </a:t>
+            </a:r>
+          </a:p>
+          <a:p>
+            <a:r>
+              <a:rPr lang="en-US" dirty="0"/>
+              <a:t>	struct and not the original struct, this is called pass by value.</a:t>
+            </a:r>
+          </a:p>
+        </p:txBody>
+      </p:sp>
+      <p:pic>
+        <p:nvPicPr>
+          <p:cNvPr id="4" name="Online Media 3" title="Difference between Pass by value and Pass by reference 26">
+            <a:hlinkClick r:id="" action="ppaction://media"/>
+            <a:extLst>
+              <a:ext uri="{FF2B5EF4-FFF2-40B4-BE49-F238E27FC236}">
+                <a16:creationId xmlns:a16="http://schemas.microsoft.com/office/drawing/2014/main" id="{D7DB0909-4F52-4590-9EB9-4C5CB12E2F90}"/>
+              </a:ext>
+            </a:extLst>
+          </p:cNvPr>
+          <p:cNvPicPr>
+            <a:picLocks noRot="1" noChangeAspect="1"/>
+          </p:cNvPicPr>
+          <p:nvPr>
+            <a:videoFile r:link="rId1"/>
+          </p:nvPr>
+        </p:nvPicPr>
+        <p:blipFill>
+          <a:blip r:embed="rId3"/>
+          <a:stretch>
+            <a:fillRect/>
+          </a:stretch>
+        </p:blipFill>
+        <p:spPr>
+          <a:xfrm>
+            <a:off x="3740728" y="2492334"/>
+            <a:ext cx="6096000" cy="3429000"/>
+          </a:xfrm>
+          <a:prstGeom prst="rect">
+            <a:avLst/>
+          </a:prstGeom>
+        </p:spPr>
+      </p:pic>
+    </p:spTree>
+    <p:extLst>
+      <p:ext uri="{BB962C8B-B14F-4D97-AF65-F5344CB8AC3E}">
+        <p14:creationId xmlns:p14="http://schemas.microsoft.com/office/powerpoint/2010/main" val="3512122899"/>
+      </p:ext>
+    </p:extLst>
+  </p:cSld>
+  <p:clrMapOvr>
+    <a:masterClrMapping/>
+  </p:clrMapOvr>
+  <p:timing>
+    <p:tnLst>
+      <p:par>
+        <p:cTn id="1" dur="indefinite" restart="never" nodeType="tmRoot">
+          <p:childTnLst>
+            <p:seq concurrent="1" nextAc="seek">
+              <p:cTn id="2" dur="indefinite" nodeType="mainSeq">
+                <p:childTnLst>
+                  <p:par>
+                    <p:cTn id="3" fill="hold">
+                      <p:stCondLst>
+                        <p:cond delay="indefinite"/>
+                      </p:stCondLst>
+                      <p:childTnLst>
+                        <p:par>
+                          <p:cTn id="4" fill="hold">
+                            <p:stCondLst>
+                              <p:cond delay="0"/>
+                            </p:stCondLst>
+                            <p:childTnLst>
+                              <p:par>
+                                <p:cTn id="5" presetID="1" presetClass="mediacall" presetSubtype="0" fill="hold" nodeType="clickEffect">
+                                  <p:stCondLst>
+                                    <p:cond delay="0"/>
+                                  </p:stCondLst>
+                                  <p:childTnLst>
+                                    <p:cmd type="call" cmd="playFrom(0.0)">
+                                      <p:cBhvr>
+                                        <p:cTn id="6" dur="1" fill="hold"/>
+                                        <p:tgtEl>
+                                          <p:spTgt spid="4"/>
+                                        </p:tgtEl>
+                                      </p:cBhvr>
+                                    </p:cmd>
+                                  </p:childTnLst>
+                                </p:cTn>
+                              </p:par>
+                            </p:childTnLst>
+                          </p:cTn>
+                        </p:par>
+                      </p:childTnLst>
+                    </p:cTn>
+                  </p:par>
+                </p:childTnLst>
+              </p:cTn>
+              <p:prevCondLst>
+                <p:cond evt="onPrev" delay="0">
+                  <p:tgtEl>
+                    <p:sldTgt/>
+                  </p:tgtEl>
+                </p:cond>
+              </p:prevCondLst>
+              <p:nextCondLst>
+                <p:cond evt="onNext" delay="0">
+                  <p:tgtEl>
+                    <p:sldTgt/>
+                  </p:tgtEl>
+                </p:cond>
+              </p:nextCondLst>
+            </p:seq>
+            <p:video>
+              <p:cMediaNode vol="80000">
+                <p:cTn id="7" fill="hold" display="0">
+                  <p:stCondLst>
+                    <p:cond delay="indefinite"/>
+                  </p:stCondLst>
+                </p:cTn>
+                <p:tgtEl>
+                  <p:spTgt spid="4"/>
+                </p:tgtEl>
+              </p:cMediaNode>
+            </p:video>
+            <p:seq concurrent="1" nextAc="seek">
+              <p:cTn id="8" restart="whenNotActive" fill="hold" evtFilter="cancelBubble" nodeType="interactiveSeq">
+                <p:stCondLst>
+                  <p:cond evt="onClick" delay="0">
+                    <p:tgtEl>
+                      <p:spTgt spid="4"/>
+                    </p:tgtEl>
+                  </p:cond>
+                </p:stCondLst>
+                <p:endSync evt="end" delay="0">
+                  <p:rtn val="all"/>
+                </p:endSync>
+                <p:childTnLst>
+                  <p:par>
+                    <p:cTn id="9" fill="hold">
+                      <p:stCondLst>
+                        <p:cond delay="0"/>
+                      </p:stCondLst>
+                      <p:childTnLst>
+                        <p:par>
+                          <p:cTn id="10" fill="hold">
+                            <p:stCondLst>
+                              <p:cond delay="0"/>
+                            </p:stCondLst>
+                            <p:childTnLst>
+                              <p:par>
+                                <p:cTn id="11" presetID="2" presetClass="mediacall" presetSubtype="0" fill="hold" nodeType="clickEffect">
+                                  <p:stCondLst>
+                                    <p:cond delay="0"/>
+                                  </p:stCondLst>
+                                  <p:childTnLst>
+                                    <p:cmd type="call" cmd="togglePause">
+                                      <p:cBhvr>
+                                        <p:cTn id="12" dur="1" fill="hold"/>
+                                        <p:tgtEl>
+                                          <p:spTgt spid="4"/>
+                                        </p:tgtEl>
+                                      </p:cBhvr>
+                                    </p:cmd>
+                                  </p:childTnLst>
+                                </p:cTn>
+                              </p:par>
+                            </p:childTnLst>
+                          </p:cTn>
+                        </p:par>
+                      </p:childTnLst>
+                    </p:cTn>
+                  </p:par>
+                </p:childTnLst>
+              </p:cTn>
+              <p:nextCondLst>
+                <p:cond evt="onClick" delay="0">
+                  <p:tgtEl>
+                    <p:spTgt spid="4"/>
+                  </p:tgtEl>
+                </p:cond>
+              </p:nextCondLst>
+            </p:seq>
+          </p:childTnLst>
+        </p:cTn>
+      </p:par>
+    </p:tnLst>
+  </p:timing>
+</p:sld>
+</file>
+
 <file path=ppt/theme/theme1.xml><?xml version="1.0" encoding="utf-8"?>
 <a:theme xmlns:a="http://schemas.openxmlformats.org/drawingml/2006/main" name="Frame">
   <a:themeElements>

</xml_diff>

<commit_message>
Create Rame slide and source code file structs_ex.go
</commit_message>
<xml_diff>
--- a/pointers/Pointers & Pass by Value.pptx
+++ b/pointers/Pointers & Pass by Value.pptx
@@ -7,6 +7,7 @@
   <p:sldIdLst>
     <p:sldId id="256" r:id="rId2"/>
     <p:sldId id="257" r:id="rId3"/>
+    <p:sldId id="258" r:id="rId4"/>
   </p:sldIdLst>
   <p:sldSz cx="12192000" cy="6858000"/>
   <p:notesSz cx="6858000" cy="9144000"/>
@@ -105,6 +106,11 @@
       </a:defRPr>
     </a:lvl9pPr>
   </p:defaultTextStyle>
+  <p:extLst>
+    <p:ext uri="{EFAFB233-063F-42B5-8137-9DF3F51BA10A}">
+      <p15:sldGuideLst xmlns:p15="http://schemas.microsoft.com/office/powerpoint/2012/main"/>
+    </p:ext>
+  </p:extLst>
 </p:presentation>
 </file>
 
@@ -333,7 +339,7 @@
             <a:fld id="{5586B75A-687E-405C-8A0B-8D00578BA2C3}" type="datetimeFigureOut">
               <a:rPr lang="en-US" dirty="0"/>
               <a:pPr/>
-              <a:t>7/28/2019</a:t>
+              <a:t>7/31/2019</a:t>
             </a:fld>
             <a:endParaRPr lang="en-US" dirty="0"/>
           </a:p>
@@ -500,7 +506,7 @@
             <a:fld id="{5586B75A-687E-405C-8A0B-8D00578BA2C3}" type="datetimeFigureOut">
               <a:rPr lang="en-US" dirty="0"/>
               <a:pPr/>
-              <a:t>7/28/2019</a:t>
+              <a:t>7/31/2019</a:t>
             </a:fld>
             <a:endParaRPr lang="en-US" dirty="0"/>
           </a:p>
@@ -677,7 +683,7 @@
             <a:fld id="{5586B75A-687E-405C-8A0B-8D00578BA2C3}" type="datetimeFigureOut">
               <a:rPr lang="en-US" dirty="0"/>
               <a:pPr/>
-              <a:t>7/28/2019</a:t>
+              <a:t>7/31/2019</a:t>
             </a:fld>
             <a:endParaRPr lang="en-US" dirty="0"/>
           </a:p>
@@ -844,7 +850,7 @@
             <a:fld id="{5586B75A-687E-405C-8A0B-8D00578BA2C3}" type="datetimeFigureOut">
               <a:rPr lang="en-US" dirty="0"/>
               <a:pPr/>
-              <a:t>7/28/2019</a:t>
+              <a:t>7/31/2019</a:t>
             </a:fld>
             <a:endParaRPr lang="en-US" dirty="0"/>
           </a:p>
@@ -1099,7 +1105,7 @@
             <a:fld id="{5586B75A-687E-405C-8A0B-8D00578BA2C3}" type="datetimeFigureOut">
               <a:rPr lang="en-US" dirty="0"/>
               <a:pPr/>
-              <a:t>7/28/2019</a:t>
+              <a:t>7/31/2019</a:t>
             </a:fld>
             <a:endParaRPr lang="en-US" dirty="0"/>
           </a:p>
@@ -1384,7 +1390,7 @@
             <a:fld id="{5586B75A-687E-405C-8A0B-8D00578BA2C3}" type="datetimeFigureOut">
               <a:rPr lang="en-US" dirty="0"/>
               <a:pPr/>
-              <a:t>7/28/2019</a:t>
+              <a:t>7/31/2019</a:t>
             </a:fld>
             <a:endParaRPr lang="en-US" dirty="0"/>
           </a:p>
@@ -1823,7 +1829,7 @@
             <a:fld id="{5586B75A-687E-405C-8A0B-8D00578BA2C3}" type="datetimeFigureOut">
               <a:rPr lang="en-US" dirty="0"/>
               <a:pPr/>
-              <a:t>7/28/2019</a:t>
+              <a:t>7/31/2019</a:t>
             </a:fld>
             <a:endParaRPr lang="en-US" dirty="0"/>
           </a:p>
@@ -1938,7 +1944,7 @@
             <a:fld id="{5586B75A-687E-405C-8A0B-8D00578BA2C3}" type="datetimeFigureOut">
               <a:rPr lang="en-US" dirty="0"/>
               <a:pPr/>
-              <a:t>7/28/2019</a:t>
+              <a:t>7/31/2019</a:t>
             </a:fld>
             <a:endParaRPr lang="en-US" dirty="0"/>
           </a:p>
@@ -2030,7 +2036,7 @@
             <a:fld id="{5586B75A-687E-405C-8A0B-8D00578BA2C3}" type="datetimeFigureOut">
               <a:rPr lang="en-US" dirty="0"/>
               <a:pPr/>
-              <a:t>7/28/2019</a:t>
+              <a:t>7/31/2019</a:t>
             </a:fld>
             <a:endParaRPr lang="en-US" dirty="0"/>
           </a:p>
@@ -2315,7 +2321,7 @@
             <a:fld id="{5586B75A-687E-405C-8A0B-8D00578BA2C3}" type="datetimeFigureOut">
               <a:rPr lang="en-US" dirty="0"/>
               <a:pPr/>
-              <a:t>7/28/2019</a:t>
+              <a:t>7/31/2019</a:t>
             </a:fld>
             <a:endParaRPr lang="en-US" dirty="0"/>
           </a:p>
@@ -2585,7 +2591,7 @@
             <a:fld id="{5586B75A-687E-405C-8A0B-8D00578BA2C3}" type="datetimeFigureOut">
               <a:rPr lang="en-US" dirty="0"/>
               <a:pPr/>
-              <a:t>7/28/2019</a:t>
+              <a:t>7/31/2019</a:t>
             </a:fld>
             <a:endParaRPr lang="en-US" dirty="0"/>
           </a:p>
@@ -2879,7 +2885,7 @@
             <a:fld id="{5586B75A-687E-405C-8A0B-8D00578BA2C3}" type="datetimeFigureOut">
               <a:rPr lang="en-US" dirty="0"/>
               <a:pPr/>
-              <a:t>7/28/2019</a:t>
+              <a:t>7/31/2019</a:t>
             </a:fld>
             <a:endParaRPr lang="en-US" dirty="0"/>
           </a:p>
@@ -3734,6 +3740,547 @@
 </p:sld>
 </file>
 
+<file path=ppt/slides/slide3.xml><?xml version="1.0" encoding="utf-8"?>
+<p:sld xmlns:a="http://schemas.openxmlformats.org/drawingml/2006/main" xmlns:r="http://schemas.openxmlformats.org/officeDocument/2006/relationships" xmlns:p="http://schemas.openxmlformats.org/presentationml/2006/main">
+  <p:cSld>
+    <p:spTree>
+      <p:nvGrpSpPr>
+        <p:cNvPr id="1" name=""/>
+        <p:cNvGrpSpPr/>
+        <p:nvPr/>
+      </p:nvGrpSpPr>
+      <p:grpSpPr>
+        <a:xfrm>
+          <a:off x="0" y="0"/>
+          <a:ext cx="0" cy="0"/>
+          <a:chOff x="0" y="0"/>
+          <a:chExt cx="0" cy="0"/>
+        </a:xfrm>
+      </p:grpSpPr>
+      <p:sp>
+        <p:nvSpPr>
+          <p:cNvPr id="2" name="Title 1">
+            <a:extLst>
+              <a:ext uri="{FF2B5EF4-FFF2-40B4-BE49-F238E27FC236}">
+                <a16:creationId xmlns:a16="http://schemas.microsoft.com/office/drawing/2014/main" id="{90DFF721-92E8-4A12-A8AC-D48465CF8CF1}"/>
+              </a:ext>
+            </a:extLst>
+          </p:cNvPr>
+          <p:cNvSpPr>
+            <a:spLocks noGrp="1"/>
+          </p:cNvSpPr>
+          <p:nvPr>
+            <p:ph type="title"/>
+          </p:nvPr>
+        </p:nvSpPr>
+        <p:spPr/>
+        <p:txBody>
+          <a:bodyPr/>
+          <a:lstStyle/>
+          <a:p>
+            <a:r>
+              <a:rPr lang="en-US" dirty="0"/>
+              <a:t>Simplified RAM representation</a:t>
+            </a:r>
+          </a:p>
+        </p:txBody>
+      </p:sp>
+      <p:graphicFrame>
+        <p:nvGraphicFramePr>
+          <p:cNvPr id="3" name="Table 2">
+            <a:extLst>
+              <a:ext uri="{FF2B5EF4-FFF2-40B4-BE49-F238E27FC236}">
+                <a16:creationId xmlns:a16="http://schemas.microsoft.com/office/drawing/2014/main" id="{8E480320-CE47-412E-A7E4-6FBCD59BF50A}"/>
+              </a:ext>
+            </a:extLst>
+          </p:cNvPr>
+          <p:cNvGraphicFramePr>
+            <a:graphicFrameLocks noGrp="1"/>
+          </p:cNvGraphicFramePr>
+          <p:nvPr>
+            <p:extLst>
+              <p:ext uri="{D42A27DB-BD31-4B8C-83A1-F6EECF244321}">
+                <p14:modId xmlns:p14="http://schemas.microsoft.com/office/powerpoint/2010/main" val="2096867818"/>
+              </p:ext>
+            </p:extLst>
+          </p:nvPr>
+        </p:nvGraphicFramePr>
+        <p:xfrm>
+          <a:off x="3587667" y="945297"/>
+          <a:ext cx="6945746" cy="2225040"/>
+        </p:xfrm>
+        <a:graphic>
+          <a:graphicData uri="http://schemas.openxmlformats.org/drawingml/2006/table">
+            <a:tbl>
+              <a:tblPr firstRow="1" bandRow="1">
+                <a:tableStyleId>{5C22544A-7EE6-4342-B048-85BDC9FD1C3A}</a:tableStyleId>
+              </a:tblPr>
+              <a:tblGrid>
+                <a:gridCol w="3472873">
+                  <a:extLst>
+                    <a:ext uri="{9D8B030D-6E8A-4147-A177-3AD203B41FA5}">
+                      <a16:colId xmlns:a16="http://schemas.microsoft.com/office/drawing/2014/main" val="365988799"/>
+                    </a:ext>
+                  </a:extLst>
+                </a:gridCol>
+                <a:gridCol w="3472873">
+                  <a:extLst>
+                    <a:ext uri="{9D8B030D-6E8A-4147-A177-3AD203B41FA5}">
+                      <a16:colId xmlns:a16="http://schemas.microsoft.com/office/drawing/2014/main" val="1057789493"/>
+                    </a:ext>
+                  </a:extLst>
+                </a:gridCol>
+              </a:tblGrid>
+              <a:tr h="370840">
+                <a:tc>
+                  <a:txBody>
+                    <a:bodyPr/>
+                    <a:lstStyle/>
+                    <a:p>
+                      <a:r>
+                        <a:rPr lang="en-US" dirty="0"/>
+                        <a:t>Address</a:t>
+                      </a:r>
+                    </a:p>
+                  </a:txBody>
+                  <a:tcPr/>
+                </a:tc>
+                <a:tc>
+                  <a:txBody>
+                    <a:bodyPr/>
+                    <a:lstStyle/>
+                    <a:p>
+                      <a:r>
+                        <a:rPr lang="en-US" dirty="0"/>
+                        <a:t>Value</a:t>
+                      </a:r>
+                    </a:p>
+                  </a:txBody>
+                  <a:tcPr/>
+                </a:tc>
+                <a:extLst>
+                  <a:ext uri="{0D108BD9-81ED-4DB2-BD59-A6C34878D82A}">
+                    <a16:rowId xmlns:a16="http://schemas.microsoft.com/office/drawing/2014/main" val="2902521088"/>
+                  </a:ext>
+                </a:extLst>
+              </a:tr>
+              <a:tr h="370840">
+                <a:tc>
+                  <a:txBody>
+                    <a:bodyPr/>
+                    <a:lstStyle/>
+                    <a:p>
+                      <a:r>
+                        <a:rPr lang="en-US" dirty="0"/>
+                        <a:t>0x0000</a:t>
+                      </a:r>
+                    </a:p>
+                  </a:txBody>
+                  <a:tcPr/>
+                </a:tc>
+                <a:tc>
+                  <a:txBody>
+                    <a:bodyPr/>
+                    <a:lstStyle/>
+                    <a:p>
+                      <a:endParaRPr lang="en-US"/>
+                    </a:p>
+                  </a:txBody>
+                  <a:tcPr/>
+                </a:tc>
+                <a:extLst>
+                  <a:ext uri="{0D108BD9-81ED-4DB2-BD59-A6C34878D82A}">
+                    <a16:rowId xmlns:a16="http://schemas.microsoft.com/office/drawing/2014/main" val="810544391"/>
+                  </a:ext>
+                </a:extLst>
+              </a:tr>
+              <a:tr h="370840">
+                <a:tc>
+                  <a:txBody>
+                    <a:bodyPr/>
+                    <a:lstStyle/>
+                    <a:p>
+                      <a:r>
+                        <a:rPr lang="en-US" dirty="0"/>
+                        <a:t>0x0001</a:t>
+                      </a:r>
+                    </a:p>
+                  </a:txBody>
+                  <a:tcPr/>
+                </a:tc>
+                <a:tc>
+                  <a:txBody>
+                    <a:bodyPr/>
+                    <a:lstStyle/>
+                    <a:p>
+                      <a:r>
+                        <a:rPr lang="en-US" dirty="0"/>
+                        <a:t>person{</a:t>
+                      </a:r>
+                      <a:r>
+                        <a:rPr lang="en-US" dirty="0" err="1"/>
+                        <a:t>firstName</a:t>
+                      </a:r>
+                      <a:r>
+                        <a:rPr lang="en-US" dirty="0"/>
+                        <a:t>: “Kevin”…}</a:t>
+                      </a:r>
+                    </a:p>
+                  </a:txBody>
+                  <a:tcPr/>
+                </a:tc>
+                <a:extLst>
+                  <a:ext uri="{0D108BD9-81ED-4DB2-BD59-A6C34878D82A}">
+                    <a16:rowId xmlns:a16="http://schemas.microsoft.com/office/drawing/2014/main" val="542162769"/>
+                  </a:ext>
+                </a:extLst>
+              </a:tr>
+              <a:tr h="370840">
+                <a:tc>
+                  <a:txBody>
+                    <a:bodyPr/>
+                    <a:lstStyle/>
+                    <a:p>
+                      <a:r>
+                        <a:rPr lang="en-US" dirty="0"/>
+                        <a:t>0x0002</a:t>
+                      </a:r>
+                    </a:p>
+                  </a:txBody>
+                  <a:tcPr/>
+                </a:tc>
+                <a:tc>
+                  <a:txBody>
+                    <a:bodyPr/>
+                    <a:lstStyle/>
+                    <a:p>
+                      <a:endParaRPr lang="en-US"/>
+                    </a:p>
+                  </a:txBody>
+                  <a:tcPr/>
+                </a:tc>
+                <a:extLst>
+                  <a:ext uri="{0D108BD9-81ED-4DB2-BD59-A6C34878D82A}">
+                    <a16:rowId xmlns:a16="http://schemas.microsoft.com/office/drawing/2014/main" val="291919650"/>
+                  </a:ext>
+                </a:extLst>
+              </a:tr>
+              <a:tr h="370840">
+                <a:tc>
+                  <a:txBody>
+                    <a:bodyPr/>
+                    <a:lstStyle/>
+                    <a:p>
+                      <a:r>
+                        <a:rPr lang="en-US" dirty="0"/>
+                        <a:t>0x003</a:t>
+                      </a:r>
+                    </a:p>
+                  </a:txBody>
+                  <a:tcPr/>
+                </a:tc>
+                <a:tc>
+                  <a:txBody>
+                    <a:bodyPr/>
+                    <a:lstStyle/>
+                    <a:p>
+                      <a:endParaRPr lang="en-US" dirty="0"/>
+                    </a:p>
+                  </a:txBody>
+                  <a:tcPr/>
+                </a:tc>
+                <a:extLst>
+                  <a:ext uri="{0D108BD9-81ED-4DB2-BD59-A6C34878D82A}">
+                    <a16:rowId xmlns:a16="http://schemas.microsoft.com/office/drawing/2014/main" val="3794104390"/>
+                  </a:ext>
+                </a:extLst>
+              </a:tr>
+              <a:tr h="370840">
+                <a:tc>
+                  <a:txBody>
+                    <a:bodyPr/>
+                    <a:lstStyle/>
+                    <a:p>
+                      <a:r>
+                        <a:rPr lang="en-US" dirty="0"/>
+                        <a:t>0x004</a:t>
+                      </a:r>
+                    </a:p>
+                  </a:txBody>
+                  <a:tcPr/>
+                </a:tc>
+                <a:tc>
+                  <a:txBody>
+                    <a:bodyPr/>
+                    <a:lstStyle/>
+                    <a:p>
+                      <a:pPr marL="0" marR="0" lvl="0" indent="0" algn="l" defTabSz="914400" rtl="0" eaLnBrk="1" fontAlgn="auto" latinLnBrk="0" hangingPunct="1">
+                        <a:lnSpc>
+                          <a:spcPct val="100000"/>
+                        </a:lnSpc>
+                        <a:spcBef>
+                          <a:spcPts val="0"/>
+                        </a:spcBef>
+                        <a:spcAft>
+                          <a:spcPts val="0"/>
+                        </a:spcAft>
+                        <a:buClrTx/>
+                        <a:buSzTx/>
+                        <a:buFontTx/>
+                        <a:buNone/>
+                        <a:tabLst/>
+                        <a:defRPr/>
+                      </a:pPr>
+                      <a:r>
+                        <a:rPr lang="en-US" dirty="0"/>
+                        <a:t>person{</a:t>
+                      </a:r>
+                      <a:r>
+                        <a:rPr lang="en-US" dirty="0" err="1"/>
+                        <a:t>firstName</a:t>
+                      </a:r>
+                      <a:r>
+                        <a:rPr lang="en-US" dirty="0"/>
+                        <a:t>: “Kevin”…}</a:t>
+                      </a:r>
+                    </a:p>
+                  </a:txBody>
+                  <a:tcPr/>
+                </a:tc>
+                <a:extLst>
+                  <a:ext uri="{0D108BD9-81ED-4DB2-BD59-A6C34878D82A}">
+                    <a16:rowId xmlns:a16="http://schemas.microsoft.com/office/drawing/2014/main" val="77800720"/>
+                  </a:ext>
+                </a:extLst>
+              </a:tr>
+            </a:tbl>
+          </a:graphicData>
+        </a:graphic>
+      </p:graphicFrame>
+      <p:sp>
+        <p:nvSpPr>
+          <p:cNvPr id="4" name="Rectangle 3">
+            <a:extLst>
+              <a:ext uri="{FF2B5EF4-FFF2-40B4-BE49-F238E27FC236}">
+                <a16:creationId xmlns:a16="http://schemas.microsoft.com/office/drawing/2014/main" id="{B554EF5B-EAFF-4A69-85CB-C7ED0963DADE}"/>
+              </a:ext>
+            </a:extLst>
+          </p:cNvPr>
+          <p:cNvSpPr/>
+          <p:nvPr/>
+        </p:nvSpPr>
+        <p:spPr>
+          <a:xfrm>
+            <a:off x="6258878" y="123195"/>
+            <a:ext cx="1603324" cy="923330"/>
+          </a:xfrm>
+          <a:prstGeom prst="rect">
+            <a:avLst/>
+          </a:prstGeom>
+          <a:noFill/>
+        </p:spPr>
+        <p:txBody>
+          <a:bodyPr wrap="none" lIns="91440" tIns="45720" rIns="91440" bIns="45720">
+            <a:spAutoFit/>
+          </a:bodyPr>
+          <a:lstStyle/>
+          <a:p>
+            <a:pPr algn="ctr"/>
+            <a:r>
+              <a:rPr lang="en-US" sz="5400" b="0" cap="none" spc="0" dirty="0">
+                <a:ln w="0"/>
+                <a:solidFill>
+                  <a:schemeClr val="tx1"/>
+                </a:solidFill>
+                <a:effectLst>
+                  <a:outerShdw blurRad="38100" dist="19050" dir="2700000" algn="tl" rotWithShape="0">
+                    <a:schemeClr val="dk1">
+                      <a:alpha val="40000"/>
+                    </a:schemeClr>
+                  </a:outerShdw>
+                </a:effectLst>
+              </a:rPr>
+              <a:t>RAM</a:t>
+            </a:r>
+          </a:p>
+        </p:txBody>
+      </p:sp>
+      <p:sp>
+        <p:nvSpPr>
+          <p:cNvPr id="5" name="TextBox 4">
+            <a:extLst>
+              <a:ext uri="{FF2B5EF4-FFF2-40B4-BE49-F238E27FC236}">
+                <a16:creationId xmlns:a16="http://schemas.microsoft.com/office/drawing/2014/main" id="{6253D444-0B95-4E69-BCD0-03EB690CB671}"/>
+              </a:ext>
+            </a:extLst>
+          </p:cNvPr>
+          <p:cNvSpPr txBox="1"/>
+          <p:nvPr/>
+        </p:nvSpPr>
+        <p:spPr>
+          <a:xfrm>
+            <a:off x="10864375" y="1694422"/>
+            <a:ext cx="716030" cy="369332"/>
+          </a:xfrm>
+          <a:prstGeom prst="rect">
+            <a:avLst/>
+          </a:prstGeom>
+          <a:noFill/>
+          <a:ln>
+            <a:solidFill>
+              <a:schemeClr val="tx1"/>
+            </a:solidFill>
+          </a:ln>
+        </p:spPr>
+        <p:txBody>
+          <a:bodyPr wrap="none" rtlCol="0">
+            <a:spAutoFit/>
+          </a:bodyPr>
+          <a:lstStyle/>
+          <a:p>
+            <a:r>
+              <a:rPr lang="en-US" dirty="0"/>
+              <a:t>Kevin</a:t>
+            </a:r>
+          </a:p>
+        </p:txBody>
+      </p:sp>
+      <p:cxnSp>
+        <p:nvCxnSpPr>
+          <p:cNvPr id="7" name="Straight Arrow Connector 6">
+            <a:extLst>
+              <a:ext uri="{FF2B5EF4-FFF2-40B4-BE49-F238E27FC236}">
+                <a16:creationId xmlns:a16="http://schemas.microsoft.com/office/drawing/2014/main" id="{F9F96A49-C79F-4024-A1FA-9B01156519D5}"/>
+              </a:ext>
+            </a:extLst>
+          </p:cNvPr>
+          <p:cNvCxnSpPr>
+            <a:cxnSpLocks/>
+            <a:stCxn id="5" idx="1"/>
+          </p:cNvCxnSpPr>
+          <p:nvPr/>
+        </p:nvCxnSpPr>
+        <p:spPr>
+          <a:xfrm flipH="1">
+            <a:off x="10531981" y="1879088"/>
+            <a:ext cx="332394" cy="0"/>
+          </a:xfrm>
+          <a:prstGeom prst="straightConnector1">
+            <a:avLst/>
+          </a:prstGeom>
+          <a:ln>
+            <a:tailEnd type="triangle"/>
+          </a:ln>
+        </p:spPr>
+        <p:style>
+          <a:lnRef idx="1">
+            <a:schemeClr val="accent1"/>
+          </a:lnRef>
+          <a:fillRef idx="0">
+            <a:schemeClr val="accent1"/>
+          </a:fillRef>
+          <a:effectRef idx="0">
+            <a:schemeClr val="accent1"/>
+          </a:effectRef>
+          <a:fontRef idx="minor">
+            <a:schemeClr val="tx1"/>
+          </a:fontRef>
+        </p:style>
+      </p:cxnSp>
+      <p:cxnSp>
+        <p:nvCxnSpPr>
+          <p:cNvPr id="10" name="Straight Arrow Connector 9">
+            <a:extLst>
+              <a:ext uri="{FF2B5EF4-FFF2-40B4-BE49-F238E27FC236}">
+                <a16:creationId xmlns:a16="http://schemas.microsoft.com/office/drawing/2014/main" id="{D07FA75C-1A4A-4944-B67B-7B9048726526}"/>
+              </a:ext>
+            </a:extLst>
+          </p:cNvPr>
+          <p:cNvCxnSpPr>
+            <a:cxnSpLocks/>
+          </p:cNvCxnSpPr>
+          <p:nvPr/>
+        </p:nvCxnSpPr>
+        <p:spPr>
+          <a:xfrm flipH="1">
+            <a:off x="10531981" y="2993389"/>
+            <a:ext cx="332394" cy="0"/>
+          </a:xfrm>
+          <a:prstGeom prst="straightConnector1">
+            <a:avLst/>
+          </a:prstGeom>
+          <a:ln>
+            <a:tailEnd type="triangle"/>
+          </a:ln>
+        </p:spPr>
+        <p:style>
+          <a:lnRef idx="1">
+            <a:schemeClr val="accent1"/>
+          </a:lnRef>
+          <a:fillRef idx="0">
+            <a:schemeClr val="accent1"/>
+          </a:fillRef>
+          <a:effectRef idx="0">
+            <a:schemeClr val="accent1"/>
+          </a:effectRef>
+          <a:fontRef idx="minor">
+            <a:schemeClr val="tx1"/>
+          </a:fontRef>
+        </p:style>
+      </p:cxnSp>
+      <p:sp>
+        <p:nvSpPr>
+          <p:cNvPr id="11" name="TextBox 10">
+            <a:extLst>
+              <a:ext uri="{FF2B5EF4-FFF2-40B4-BE49-F238E27FC236}">
+                <a16:creationId xmlns:a16="http://schemas.microsoft.com/office/drawing/2014/main" id="{30B03726-3796-44B7-9025-97B0930EBCB5}"/>
+              </a:ext>
+            </a:extLst>
+          </p:cNvPr>
+          <p:cNvSpPr txBox="1"/>
+          <p:nvPr/>
+        </p:nvSpPr>
+        <p:spPr>
+          <a:xfrm>
+            <a:off x="10905710" y="2801005"/>
+            <a:ext cx="306494" cy="369332"/>
+          </a:xfrm>
+          <a:prstGeom prst="rect">
+            <a:avLst/>
+          </a:prstGeom>
+          <a:noFill/>
+          <a:ln>
+            <a:solidFill>
+              <a:schemeClr val="tx1"/>
+            </a:solidFill>
+          </a:ln>
+        </p:spPr>
+        <p:txBody>
+          <a:bodyPr wrap="none" rtlCol="0">
+            <a:spAutoFit/>
+          </a:bodyPr>
+          <a:lstStyle/>
+          <a:p>
+            <a:r>
+              <a:rPr lang="en-US" dirty="0"/>
+              <a:t>p</a:t>
+            </a:r>
+          </a:p>
+        </p:txBody>
+      </p:sp>
+    </p:spTree>
+    <p:extLst>
+      <p:ext uri="{BB962C8B-B14F-4D97-AF65-F5344CB8AC3E}">
+        <p14:creationId xmlns:p14="http://schemas.microsoft.com/office/powerpoint/2010/main" val="606541130"/>
+      </p:ext>
+    </p:extLst>
+  </p:cSld>
+  <p:clrMapOvr>
+    <a:masterClrMapping/>
+  </p:clrMapOvr>
+</p:sld>
+</file>
+
 <file path=ppt/theme/theme1.xml><?xml version="1.0" encoding="utf-8"?>
 <a:theme xmlns:a="http://schemas.openxmlformats.org/drawingml/2006/main" name="Frame">
   <a:themeElements>

</xml_diff>

<commit_message>
Create pointer operator slide
</commit_message>
<xml_diff>
--- a/pointers/Pointers & Pass by Value.pptx
+++ b/pointers/Pointers & Pass by Value.pptx
@@ -8,6 +8,7 @@
     <p:sldId id="256" r:id="rId2"/>
     <p:sldId id="257" r:id="rId3"/>
     <p:sldId id="258" r:id="rId4"/>
+    <p:sldId id="259" r:id="rId5"/>
   </p:sldIdLst>
   <p:sldSz cx="12192000" cy="6858000"/>
   <p:notesSz cx="6858000" cy="9144000"/>
@@ -4281,6 +4282,226 @@
 </p:sld>
 </file>
 
+<file path=ppt/slides/slide4.xml><?xml version="1.0" encoding="utf-8"?>
+<p:sld xmlns:a="http://schemas.openxmlformats.org/drawingml/2006/main" xmlns:r="http://schemas.openxmlformats.org/officeDocument/2006/relationships" xmlns:p="http://schemas.openxmlformats.org/presentationml/2006/main">
+  <p:cSld>
+    <p:spTree>
+      <p:nvGrpSpPr>
+        <p:cNvPr id="1" name=""/>
+        <p:cNvGrpSpPr/>
+        <p:nvPr/>
+      </p:nvGrpSpPr>
+      <p:grpSpPr>
+        <a:xfrm>
+          <a:off x="0" y="0"/>
+          <a:ext cx="0" cy="0"/>
+          <a:chOff x="0" y="0"/>
+          <a:chExt cx="0" cy="0"/>
+        </a:xfrm>
+      </p:grpSpPr>
+      <p:sp>
+        <p:nvSpPr>
+          <p:cNvPr id="2" name="Title 1">
+            <a:extLst>
+              <a:ext uri="{FF2B5EF4-FFF2-40B4-BE49-F238E27FC236}">
+                <a16:creationId xmlns:a16="http://schemas.microsoft.com/office/drawing/2014/main" id="{770589E6-D591-43F4-96EA-CD48F2953843}"/>
+              </a:ext>
+            </a:extLst>
+          </p:cNvPr>
+          <p:cNvSpPr>
+            <a:spLocks noGrp="1"/>
+          </p:cNvSpPr>
+          <p:nvPr>
+            <p:ph type="title"/>
+          </p:nvPr>
+        </p:nvSpPr>
+        <p:spPr/>
+        <p:txBody>
+          <a:bodyPr/>
+          <a:lstStyle/>
+          <a:p>
+            <a:r>
+              <a:rPr lang="en-US" dirty="0"/>
+              <a:t>Pointer operators</a:t>
+            </a:r>
+          </a:p>
+        </p:txBody>
+      </p:sp>
+      <p:sp>
+        <p:nvSpPr>
+          <p:cNvPr id="3" name="TextBox 2">
+            <a:extLst>
+              <a:ext uri="{FF2B5EF4-FFF2-40B4-BE49-F238E27FC236}">
+                <a16:creationId xmlns:a16="http://schemas.microsoft.com/office/drawing/2014/main" id="{5E9BC97F-062A-4CFA-AC68-BB21AADFE108}"/>
+              </a:ext>
+            </a:extLst>
+          </p:cNvPr>
+          <p:cNvSpPr txBox="1"/>
+          <p:nvPr/>
+        </p:nvSpPr>
+        <p:spPr>
+          <a:xfrm>
+            <a:off x="4281055" y="1229096"/>
+            <a:ext cx="1095172" cy="369332"/>
+          </a:xfrm>
+          <a:prstGeom prst="rect">
+            <a:avLst/>
+          </a:prstGeom>
+          <a:noFill/>
+          <a:ln>
+            <a:solidFill>
+              <a:schemeClr val="tx1"/>
+            </a:solidFill>
+          </a:ln>
+        </p:spPr>
+        <p:txBody>
+          <a:bodyPr wrap="none" rtlCol="0">
+            <a:spAutoFit/>
+          </a:bodyPr>
+          <a:lstStyle/>
+          <a:p>
+            <a:r>
+              <a:rPr lang="en-US" dirty="0"/>
+              <a:t>&amp;variable</a:t>
+            </a:r>
+          </a:p>
+        </p:txBody>
+      </p:sp>
+      <p:sp>
+        <p:nvSpPr>
+          <p:cNvPr id="4" name="TextBox 3">
+            <a:extLst>
+              <a:ext uri="{FF2B5EF4-FFF2-40B4-BE49-F238E27FC236}">
+                <a16:creationId xmlns:a16="http://schemas.microsoft.com/office/drawing/2014/main" id="{759B911D-32B0-466C-9AB0-2022EC9214AA}"/>
+              </a:ext>
+            </a:extLst>
+          </p:cNvPr>
+          <p:cNvSpPr txBox="1"/>
+          <p:nvPr/>
+        </p:nvSpPr>
+        <p:spPr>
+          <a:xfrm>
+            <a:off x="4281055" y="3239762"/>
+            <a:ext cx="1000595" cy="369332"/>
+          </a:xfrm>
+          <a:prstGeom prst="rect">
+            <a:avLst/>
+          </a:prstGeom>
+          <a:noFill/>
+          <a:ln>
+            <a:solidFill>
+              <a:schemeClr val="tx1"/>
+            </a:solidFill>
+          </a:ln>
+        </p:spPr>
+        <p:txBody>
+          <a:bodyPr wrap="none" rtlCol="0">
+            <a:spAutoFit/>
+          </a:bodyPr>
+          <a:lstStyle/>
+          <a:p>
+            <a:r>
+              <a:rPr lang="en-US" dirty="0"/>
+              <a:t>*pointer</a:t>
+            </a:r>
+          </a:p>
+        </p:txBody>
+      </p:sp>
+      <p:sp>
+        <p:nvSpPr>
+          <p:cNvPr id="5" name="TextBox 4">
+            <a:extLst>
+              <a:ext uri="{FF2B5EF4-FFF2-40B4-BE49-F238E27FC236}">
+                <a16:creationId xmlns:a16="http://schemas.microsoft.com/office/drawing/2014/main" id="{30C2392B-DEFF-42E7-AD69-799FEB6E9A34}"/>
+              </a:ext>
+            </a:extLst>
+          </p:cNvPr>
+          <p:cNvSpPr txBox="1"/>
+          <p:nvPr/>
+        </p:nvSpPr>
+        <p:spPr>
+          <a:xfrm>
+            <a:off x="6006935" y="975848"/>
+            <a:ext cx="3180999" cy="646331"/>
+          </a:xfrm>
+          <a:prstGeom prst="rect">
+            <a:avLst/>
+          </a:prstGeom>
+          <a:noFill/>
+        </p:spPr>
+        <p:txBody>
+          <a:bodyPr wrap="none" rtlCol="0">
+            <a:spAutoFit/>
+          </a:bodyPr>
+          <a:lstStyle/>
+          <a:p>
+            <a:r>
+              <a:rPr lang="en-US" dirty="0"/>
+              <a:t>Return the address this variable</a:t>
+            </a:r>
+          </a:p>
+          <a:p>
+            <a:r>
+              <a:rPr lang="en-US" dirty="0"/>
+              <a:t>is pointing at.</a:t>
+            </a:r>
+          </a:p>
+        </p:txBody>
+      </p:sp>
+      <p:sp>
+        <p:nvSpPr>
+          <p:cNvPr id="6" name="TextBox 5">
+            <a:extLst>
+              <a:ext uri="{FF2B5EF4-FFF2-40B4-BE49-F238E27FC236}">
+                <a16:creationId xmlns:a16="http://schemas.microsoft.com/office/drawing/2014/main" id="{E0F4EF51-C12B-4EA7-B33B-289036C655C4}"/>
+              </a:ext>
+            </a:extLst>
+          </p:cNvPr>
+          <p:cNvSpPr txBox="1"/>
+          <p:nvPr/>
+        </p:nvSpPr>
+        <p:spPr>
+          <a:xfrm>
+            <a:off x="6096000" y="2962763"/>
+            <a:ext cx="3788538" cy="646331"/>
+          </a:xfrm>
+          <a:prstGeom prst="rect">
+            <a:avLst/>
+          </a:prstGeom>
+          <a:noFill/>
+        </p:spPr>
+        <p:txBody>
+          <a:bodyPr wrap="none" rtlCol="0">
+            <a:spAutoFit/>
+          </a:bodyPr>
+          <a:lstStyle/>
+          <a:p>
+            <a:r>
+              <a:rPr lang="en-US" dirty="0"/>
+              <a:t>Return the value this memory address</a:t>
+            </a:r>
+          </a:p>
+          <a:p>
+            <a:r>
+              <a:rPr lang="en-US" dirty="0"/>
+              <a:t>is pointing at.</a:t>
+            </a:r>
+          </a:p>
+        </p:txBody>
+      </p:sp>
+    </p:spTree>
+    <p:extLst>
+      <p:ext uri="{BB962C8B-B14F-4D97-AF65-F5344CB8AC3E}">
+        <p14:creationId xmlns:p14="http://schemas.microsoft.com/office/powerpoint/2010/main" val="1153665603"/>
+      </p:ext>
+    </p:extLst>
+  </p:cSld>
+  <p:clrMapOvr>
+    <a:masterClrMapping/>
+  </p:clrMapOvr>
+</p:sld>
+</file>
+
 <file path=ppt/theme/theme1.xml><?xml version="1.0" encoding="utf-8"?>
 <a:theme xmlns:a="http://schemas.openxmlformats.org/drawingml/2006/main" name="Frame">
   <a:themeElements>

</xml_diff>

<commit_message>
Create slide representing pointer variable assignment
</commit_message>
<xml_diff>
--- a/pointers/Pointers & Pass by Value.pptx
+++ b/pointers/Pointers & Pass by Value.pptx
@@ -9,6 +9,7 @@
     <p:sldId id="257" r:id="rId3"/>
     <p:sldId id="258" r:id="rId4"/>
     <p:sldId id="259" r:id="rId5"/>
+    <p:sldId id="260" r:id="rId6"/>
   </p:sldIdLst>
   <p:sldSz cx="12192000" cy="6858000"/>
   <p:notesSz cx="6858000" cy="9144000"/>
@@ -4502,6 +4503,640 @@
 </p:sld>
 </file>
 
+<file path=ppt/slides/slide5.xml><?xml version="1.0" encoding="utf-8"?>
+<p:sld xmlns:a="http://schemas.openxmlformats.org/drawingml/2006/main" xmlns:r="http://schemas.openxmlformats.org/officeDocument/2006/relationships" xmlns:p="http://schemas.openxmlformats.org/presentationml/2006/main">
+  <p:cSld>
+    <p:spTree>
+      <p:nvGrpSpPr>
+        <p:cNvPr id="1" name=""/>
+        <p:cNvGrpSpPr/>
+        <p:nvPr/>
+      </p:nvGrpSpPr>
+      <p:grpSpPr>
+        <a:xfrm>
+          <a:off x="0" y="0"/>
+          <a:ext cx="0" cy="0"/>
+          <a:chOff x="0" y="0"/>
+          <a:chExt cx="0" cy="0"/>
+        </a:xfrm>
+      </p:grpSpPr>
+      <p:graphicFrame>
+        <p:nvGraphicFramePr>
+          <p:cNvPr id="2" name="Table 1">
+            <a:extLst>
+              <a:ext uri="{FF2B5EF4-FFF2-40B4-BE49-F238E27FC236}">
+                <a16:creationId xmlns:a16="http://schemas.microsoft.com/office/drawing/2014/main" id="{7201DFED-AABA-4038-836B-351B3F899283}"/>
+              </a:ext>
+            </a:extLst>
+          </p:cNvPr>
+          <p:cNvGraphicFramePr>
+            <a:graphicFrameLocks noGrp="1"/>
+          </p:cNvGraphicFramePr>
+          <p:nvPr>
+            <p:extLst>
+              <p:ext uri="{D42A27DB-BD31-4B8C-83A1-F6EECF244321}">
+                <p14:modId xmlns:p14="http://schemas.microsoft.com/office/powerpoint/2010/main" val="826621512"/>
+              </p:ext>
+            </p:extLst>
+          </p:nvPr>
+        </p:nvGraphicFramePr>
+        <p:xfrm>
+          <a:off x="2774207" y="2400024"/>
+          <a:ext cx="6945746" cy="2225040"/>
+        </p:xfrm>
+        <a:graphic>
+          <a:graphicData uri="http://schemas.openxmlformats.org/drawingml/2006/table">
+            <a:tbl>
+              <a:tblPr firstRow="1" bandRow="1">
+                <a:tableStyleId>{5C22544A-7EE6-4342-B048-85BDC9FD1C3A}</a:tableStyleId>
+              </a:tblPr>
+              <a:tblGrid>
+                <a:gridCol w="3472873">
+                  <a:extLst>
+                    <a:ext uri="{9D8B030D-6E8A-4147-A177-3AD203B41FA5}">
+                      <a16:colId xmlns:a16="http://schemas.microsoft.com/office/drawing/2014/main" val="365988799"/>
+                    </a:ext>
+                  </a:extLst>
+                </a:gridCol>
+                <a:gridCol w="3472873">
+                  <a:extLst>
+                    <a:ext uri="{9D8B030D-6E8A-4147-A177-3AD203B41FA5}">
+                      <a16:colId xmlns:a16="http://schemas.microsoft.com/office/drawing/2014/main" val="1057789493"/>
+                    </a:ext>
+                  </a:extLst>
+                </a:gridCol>
+              </a:tblGrid>
+              <a:tr h="370840">
+                <a:tc>
+                  <a:txBody>
+                    <a:bodyPr/>
+                    <a:lstStyle/>
+                    <a:p>
+                      <a:r>
+                        <a:rPr lang="en-US" dirty="0"/>
+                        <a:t>Address</a:t>
+                      </a:r>
+                    </a:p>
+                  </a:txBody>
+                  <a:tcPr/>
+                </a:tc>
+                <a:tc>
+                  <a:txBody>
+                    <a:bodyPr/>
+                    <a:lstStyle/>
+                    <a:p>
+                      <a:r>
+                        <a:rPr lang="en-US" dirty="0"/>
+                        <a:t>Value</a:t>
+                      </a:r>
+                    </a:p>
+                  </a:txBody>
+                  <a:tcPr/>
+                </a:tc>
+                <a:extLst>
+                  <a:ext uri="{0D108BD9-81ED-4DB2-BD59-A6C34878D82A}">
+                    <a16:rowId xmlns:a16="http://schemas.microsoft.com/office/drawing/2014/main" val="2902521088"/>
+                  </a:ext>
+                </a:extLst>
+              </a:tr>
+              <a:tr h="370840">
+                <a:tc>
+                  <a:txBody>
+                    <a:bodyPr/>
+                    <a:lstStyle/>
+                    <a:p>
+                      <a:r>
+                        <a:rPr lang="en-US" dirty="0"/>
+                        <a:t>0x0000</a:t>
+                      </a:r>
+                    </a:p>
+                  </a:txBody>
+                  <a:tcPr/>
+                </a:tc>
+                <a:tc>
+                  <a:txBody>
+                    <a:bodyPr/>
+                    <a:lstStyle/>
+                    <a:p>
+                      <a:endParaRPr lang="en-US"/>
+                    </a:p>
+                  </a:txBody>
+                  <a:tcPr/>
+                </a:tc>
+                <a:extLst>
+                  <a:ext uri="{0D108BD9-81ED-4DB2-BD59-A6C34878D82A}">
+                    <a16:rowId xmlns:a16="http://schemas.microsoft.com/office/drawing/2014/main" val="810544391"/>
+                  </a:ext>
+                </a:extLst>
+              </a:tr>
+              <a:tr h="370840">
+                <a:tc>
+                  <a:txBody>
+                    <a:bodyPr/>
+                    <a:lstStyle/>
+                    <a:p>
+                      <a:r>
+                        <a:rPr lang="en-US" dirty="0"/>
+                        <a:t>0x0001</a:t>
+                      </a:r>
+                    </a:p>
+                  </a:txBody>
+                  <a:tcPr/>
+                </a:tc>
+                <a:tc>
+                  <a:txBody>
+                    <a:bodyPr/>
+                    <a:lstStyle/>
+                    <a:p>
+                      <a:r>
+                        <a:rPr lang="en-US" dirty="0"/>
+                        <a:t>person{</a:t>
+                      </a:r>
+                      <a:r>
+                        <a:rPr lang="en-US" dirty="0" err="1"/>
+                        <a:t>firstName</a:t>
+                      </a:r>
+                      <a:r>
+                        <a:rPr lang="en-US" dirty="0"/>
+                        <a:t>: “Kevin”…}</a:t>
+                      </a:r>
+                    </a:p>
+                  </a:txBody>
+                  <a:tcPr/>
+                </a:tc>
+                <a:extLst>
+                  <a:ext uri="{0D108BD9-81ED-4DB2-BD59-A6C34878D82A}">
+                    <a16:rowId xmlns:a16="http://schemas.microsoft.com/office/drawing/2014/main" val="542162769"/>
+                  </a:ext>
+                </a:extLst>
+              </a:tr>
+              <a:tr h="370840">
+                <a:tc>
+                  <a:txBody>
+                    <a:bodyPr/>
+                    <a:lstStyle/>
+                    <a:p>
+                      <a:r>
+                        <a:rPr lang="en-US" dirty="0"/>
+                        <a:t>0x0002</a:t>
+                      </a:r>
+                    </a:p>
+                  </a:txBody>
+                  <a:tcPr/>
+                </a:tc>
+                <a:tc>
+                  <a:txBody>
+                    <a:bodyPr/>
+                    <a:lstStyle/>
+                    <a:p>
+                      <a:endParaRPr lang="en-US"/>
+                    </a:p>
+                  </a:txBody>
+                  <a:tcPr/>
+                </a:tc>
+                <a:extLst>
+                  <a:ext uri="{0D108BD9-81ED-4DB2-BD59-A6C34878D82A}">
+                    <a16:rowId xmlns:a16="http://schemas.microsoft.com/office/drawing/2014/main" val="291919650"/>
+                  </a:ext>
+                </a:extLst>
+              </a:tr>
+              <a:tr h="370840">
+                <a:tc>
+                  <a:txBody>
+                    <a:bodyPr/>
+                    <a:lstStyle/>
+                    <a:p>
+                      <a:r>
+                        <a:rPr lang="en-US" dirty="0"/>
+                        <a:t>0x003</a:t>
+                      </a:r>
+                    </a:p>
+                  </a:txBody>
+                  <a:tcPr/>
+                </a:tc>
+                <a:tc>
+                  <a:txBody>
+                    <a:bodyPr/>
+                    <a:lstStyle/>
+                    <a:p>
+                      <a:endParaRPr lang="en-US" dirty="0"/>
+                    </a:p>
+                  </a:txBody>
+                  <a:tcPr/>
+                </a:tc>
+                <a:extLst>
+                  <a:ext uri="{0D108BD9-81ED-4DB2-BD59-A6C34878D82A}">
+                    <a16:rowId xmlns:a16="http://schemas.microsoft.com/office/drawing/2014/main" val="3794104390"/>
+                  </a:ext>
+                </a:extLst>
+              </a:tr>
+              <a:tr h="370840">
+                <a:tc>
+                  <a:txBody>
+                    <a:bodyPr/>
+                    <a:lstStyle/>
+                    <a:p>
+                      <a:r>
+                        <a:rPr lang="en-US" dirty="0"/>
+                        <a:t>0x004</a:t>
+                      </a:r>
+                    </a:p>
+                  </a:txBody>
+                  <a:tcPr/>
+                </a:tc>
+                <a:tc>
+                  <a:txBody>
+                    <a:bodyPr/>
+                    <a:lstStyle/>
+                    <a:p>
+                      <a:pPr marL="0" marR="0" lvl="0" indent="0" algn="l" defTabSz="914400" rtl="0" eaLnBrk="1" fontAlgn="auto" latinLnBrk="0" hangingPunct="1">
+                        <a:lnSpc>
+                          <a:spcPct val="100000"/>
+                        </a:lnSpc>
+                        <a:spcBef>
+                          <a:spcPts val="0"/>
+                        </a:spcBef>
+                        <a:spcAft>
+                          <a:spcPts val="0"/>
+                        </a:spcAft>
+                        <a:buClrTx/>
+                        <a:buSzTx/>
+                        <a:buFontTx/>
+                        <a:buNone/>
+                        <a:tabLst/>
+                        <a:defRPr/>
+                      </a:pPr>
+                      <a:r>
+                        <a:rPr lang="en-US" dirty="0"/>
+                        <a:t>person{</a:t>
+                      </a:r>
+                      <a:r>
+                        <a:rPr lang="en-US" dirty="0" err="1"/>
+                        <a:t>firstName</a:t>
+                      </a:r>
+                      <a:r>
+                        <a:rPr lang="en-US" dirty="0"/>
+                        <a:t>: “Kevin”…}</a:t>
+                      </a:r>
+                    </a:p>
+                  </a:txBody>
+                  <a:tcPr/>
+                </a:tc>
+                <a:extLst>
+                  <a:ext uri="{0D108BD9-81ED-4DB2-BD59-A6C34878D82A}">
+                    <a16:rowId xmlns:a16="http://schemas.microsoft.com/office/drawing/2014/main" val="77800720"/>
+                  </a:ext>
+                </a:extLst>
+              </a:tr>
+            </a:tbl>
+          </a:graphicData>
+        </a:graphic>
+      </p:graphicFrame>
+      <p:sp>
+        <p:nvSpPr>
+          <p:cNvPr id="3" name="Rectangle 2">
+            <a:extLst>
+              <a:ext uri="{FF2B5EF4-FFF2-40B4-BE49-F238E27FC236}">
+                <a16:creationId xmlns:a16="http://schemas.microsoft.com/office/drawing/2014/main" id="{58603F8B-B3E1-4181-9B88-B123972CA7BF}"/>
+              </a:ext>
+            </a:extLst>
+          </p:cNvPr>
+          <p:cNvSpPr/>
+          <p:nvPr/>
+        </p:nvSpPr>
+        <p:spPr>
+          <a:xfrm>
+            <a:off x="5445418" y="1577922"/>
+            <a:ext cx="1603324" cy="923330"/>
+          </a:xfrm>
+          <a:prstGeom prst="rect">
+            <a:avLst/>
+          </a:prstGeom>
+          <a:noFill/>
+        </p:spPr>
+        <p:txBody>
+          <a:bodyPr wrap="none" lIns="91440" tIns="45720" rIns="91440" bIns="45720">
+            <a:spAutoFit/>
+          </a:bodyPr>
+          <a:lstStyle/>
+          <a:p>
+            <a:pPr algn="ctr"/>
+            <a:r>
+              <a:rPr lang="en-US" sz="5400" b="0" cap="none" spc="0" dirty="0">
+                <a:ln w="0"/>
+                <a:solidFill>
+                  <a:schemeClr val="tx1"/>
+                </a:solidFill>
+                <a:effectLst>
+                  <a:outerShdw blurRad="38100" dist="19050" dir="2700000" algn="tl" rotWithShape="0">
+                    <a:schemeClr val="dk1">
+                      <a:alpha val="40000"/>
+                    </a:schemeClr>
+                  </a:outerShdw>
+                </a:effectLst>
+              </a:rPr>
+              <a:t>RAM</a:t>
+            </a:r>
+          </a:p>
+        </p:txBody>
+      </p:sp>
+      <p:sp>
+        <p:nvSpPr>
+          <p:cNvPr id="4" name="TextBox 3">
+            <a:extLst>
+              <a:ext uri="{FF2B5EF4-FFF2-40B4-BE49-F238E27FC236}">
+                <a16:creationId xmlns:a16="http://schemas.microsoft.com/office/drawing/2014/main" id="{669AB7E3-69C3-422B-A38D-447B363AF5BF}"/>
+              </a:ext>
+            </a:extLst>
+          </p:cNvPr>
+          <p:cNvSpPr txBox="1"/>
+          <p:nvPr/>
+        </p:nvSpPr>
+        <p:spPr>
+          <a:xfrm>
+            <a:off x="10050915" y="3149149"/>
+            <a:ext cx="688778" cy="369332"/>
+          </a:xfrm>
+          <a:prstGeom prst="rect">
+            <a:avLst/>
+          </a:prstGeom>
+          <a:noFill/>
+          <a:ln>
+            <a:solidFill>
+              <a:schemeClr val="tx1"/>
+            </a:solidFill>
+          </a:ln>
+        </p:spPr>
+        <p:txBody>
+          <a:bodyPr wrap="none" rtlCol="0">
+            <a:spAutoFit/>
+          </a:bodyPr>
+          <a:lstStyle/>
+          <a:p>
+            <a:r>
+              <a:rPr lang="en-US" dirty="0"/>
+              <a:t>kevin</a:t>
+            </a:r>
+          </a:p>
+        </p:txBody>
+      </p:sp>
+      <p:cxnSp>
+        <p:nvCxnSpPr>
+          <p:cNvPr id="5" name="Straight Arrow Connector 4">
+            <a:extLst>
+              <a:ext uri="{FF2B5EF4-FFF2-40B4-BE49-F238E27FC236}">
+                <a16:creationId xmlns:a16="http://schemas.microsoft.com/office/drawing/2014/main" id="{1C4D2F91-5DD4-41DC-A5FE-975AE59D17F7}"/>
+              </a:ext>
+            </a:extLst>
+          </p:cNvPr>
+          <p:cNvCxnSpPr>
+            <a:cxnSpLocks/>
+            <a:stCxn id="4" idx="1"/>
+          </p:cNvCxnSpPr>
+          <p:nvPr/>
+        </p:nvCxnSpPr>
+        <p:spPr>
+          <a:xfrm flipH="1">
+            <a:off x="9718521" y="3333815"/>
+            <a:ext cx="332394" cy="0"/>
+          </a:xfrm>
+          <a:prstGeom prst="straightConnector1">
+            <a:avLst/>
+          </a:prstGeom>
+          <a:ln>
+            <a:tailEnd type="triangle"/>
+          </a:ln>
+        </p:spPr>
+        <p:style>
+          <a:lnRef idx="1">
+            <a:schemeClr val="accent1"/>
+          </a:lnRef>
+          <a:fillRef idx="0">
+            <a:schemeClr val="accent1"/>
+          </a:fillRef>
+          <a:effectRef idx="0">
+            <a:schemeClr val="accent1"/>
+          </a:effectRef>
+          <a:fontRef idx="minor">
+            <a:schemeClr val="tx1"/>
+          </a:fontRef>
+        </p:style>
+      </p:cxnSp>
+      <p:cxnSp>
+        <p:nvCxnSpPr>
+          <p:cNvPr id="6" name="Straight Arrow Connector 5">
+            <a:extLst>
+              <a:ext uri="{FF2B5EF4-FFF2-40B4-BE49-F238E27FC236}">
+                <a16:creationId xmlns:a16="http://schemas.microsoft.com/office/drawing/2014/main" id="{D35B68EE-9BCA-4CFB-AC1E-658905D44430}"/>
+              </a:ext>
+            </a:extLst>
+          </p:cNvPr>
+          <p:cNvCxnSpPr>
+            <a:cxnSpLocks/>
+          </p:cNvCxnSpPr>
+          <p:nvPr/>
+        </p:nvCxnSpPr>
+        <p:spPr>
+          <a:xfrm flipH="1">
+            <a:off x="9718521" y="4448116"/>
+            <a:ext cx="332394" cy="0"/>
+          </a:xfrm>
+          <a:prstGeom prst="straightConnector1">
+            <a:avLst/>
+          </a:prstGeom>
+          <a:ln>
+            <a:tailEnd type="triangle"/>
+          </a:ln>
+        </p:spPr>
+        <p:style>
+          <a:lnRef idx="1">
+            <a:schemeClr val="accent1"/>
+          </a:lnRef>
+          <a:fillRef idx="0">
+            <a:schemeClr val="accent1"/>
+          </a:fillRef>
+          <a:effectRef idx="0">
+            <a:schemeClr val="accent1"/>
+          </a:effectRef>
+          <a:fontRef idx="minor">
+            <a:schemeClr val="tx1"/>
+          </a:fontRef>
+        </p:style>
+      </p:cxnSp>
+      <p:sp>
+        <p:nvSpPr>
+          <p:cNvPr id="7" name="TextBox 6">
+            <a:extLst>
+              <a:ext uri="{FF2B5EF4-FFF2-40B4-BE49-F238E27FC236}">
+                <a16:creationId xmlns:a16="http://schemas.microsoft.com/office/drawing/2014/main" id="{938CBC55-58F0-4B33-80AA-9DA091FF2897}"/>
+              </a:ext>
+            </a:extLst>
+          </p:cNvPr>
+          <p:cNvSpPr txBox="1"/>
+          <p:nvPr/>
+        </p:nvSpPr>
+        <p:spPr>
+          <a:xfrm>
+            <a:off x="10092250" y="4255732"/>
+            <a:ext cx="306494" cy="369332"/>
+          </a:xfrm>
+          <a:prstGeom prst="rect">
+            <a:avLst/>
+          </a:prstGeom>
+          <a:noFill/>
+          <a:ln>
+            <a:solidFill>
+              <a:schemeClr val="tx1"/>
+            </a:solidFill>
+          </a:ln>
+        </p:spPr>
+        <p:txBody>
+          <a:bodyPr wrap="none" rtlCol="0">
+            <a:spAutoFit/>
+          </a:bodyPr>
+          <a:lstStyle/>
+          <a:p>
+            <a:r>
+              <a:rPr lang="en-US" dirty="0"/>
+              <a:t>p</a:t>
+            </a:r>
+          </a:p>
+        </p:txBody>
+      </p:sp>
+      <p:sp>
+        <p:nvSpPr>
+          <p:cNvPr id="8" name="TextBox 7">
+            <a:extLst>
+              <a:ext uri="{FF2B5EF4-FFF2-40B4-BE49-F238E27FC236}">
+                <a16:creationId xmlns:a16="http://schemas.microsoft.com/office/drawing/2014/main" id="{16F939E6-A801-415A-B452-140ACABA7178}"/>
+              </a:ext>
+            </a:extLst>
+          </p:cNvPr>
+          <p:cNvSpPr txBox="1"/>
+          <p:nvPr/>
+        </p:nvSpPr>
+        <p:spPr>
+          <a:xfrm>
+            <a:off x="5231081" y="612873"/>
+            <a:ext cx="2203104" cy="400110"/>
+          </a:xfrm>
+          <a:prstGeom prst="rect">
+            <a:avLst/>
+          </a:prstGeom>
+          <a:noFill/>
+        </p:spPr>
+        <p:txBody>
+          <a:bodyPr wrap="none" rtlCol="0">
+            <a:spAutoFit/>
+          </a:bodyPr>
+          <a:lstStyle/>
+          <a:p>
+            <a:r>
+              <a:rPr lang="en-US" sz="2000" b="1" dirty="0" err="1"/>
+              <a:t>kevinPtr</a:t>
+            </a:r>
+            <a:r>
+              <a:rPr lang="en-US" sz="2000" b="1" dirty="0"/>
+              <a:t> := &amp;kevin</a:t>
+            </a:r>
+          </a:p>
+        </p:txBody>
+      </p:sp>
+      <p:sp>
+        <p:nvSpPr>
+          <p:cNvPr id="9" name="TextBox 8">
+            <a:extLst>
+              <a:ext uri="{FF2B5EF4-FFF2-40B4-BE49-F238E27FC236}">
+                <a16:creationId xmlns:a16="http://schemas.microsoft.com/office/drawing/2014/main" id="{D52BC3BC-6EC1-48FC-B5AA-9B2F4FAA5C19}"/>
+              </a:ext>
+            </a:extLst>
+          </p:cNvPr>
+          <p:cNvSpPr txBox="1"/>
+          <p:nvPr/>
+        </p:nvSpPr>
+        <p:spPr>
+          <a:xfrm>
+            <a:off x="942810" y="3149149"/>
+            <a:ext cx="977319" cy="369332"/>
+          </a:xfrm>
+          <a:prstGeom prst="rect">
+            <a:avLst/>
+          </a:prstGeom>
+          <a:noFill/>
+          <a:ln>
+            <a:solidFill>
+              <a:schemeClr val="tx1"/>
+            </a:solidFill>
+          </a:ln>
+        </p:spPr>
+        <p:txBody>
+          <a:bodyPr wrap="none" rtlCol="0">
+            <a:spAutoFit/>
+          </a:bodyPr>
+          <a:lstStyle/>
+          <a:p>
+            <a:r>
+              <a:rPr lang="en-US" dirty="0" err="1"/>
+              <a:t>kevinPtr</a:t>
+            </a:r>
+            <a:endParaRPr lang="en-US" dirty="0"/>
+          </a:p>
+        </p:txBody>
+      </p:sp>
+      <p:cxnSp>
+        <p:nvCxnSpPr>
+          <p:cNvPr id="11" name="Straight Arrow Connector 10">
+            <a:extLst>
+              <a:ext uri="{FF2B5EF4-FFF2-40B4-BE49-F238E27FC236}">
+                <a16:creationId xmlns:a16="http://schemas.microsoft.com/office/drawing/2014/main" id="{07C69C03-4726-4410-A7E8-6F9F7214F892}"/>
+              </a:ext>
+            </a:extLst>
+          </p:cNvPr>
+          <p:cNvCxnSpPr>
+            <a:cxnSpLocks/>
+          </p:cNvCxnSpPr>
+          <p:nvPr/>
+        </p:nvCxnSpPr>
+        <p:spPr>
+          <a:xfrm flipV="1">
+            <a:off x="1897657" y="3333815"/>
+            <a:ext cx="876550" cy="1"/>
+          </a:xfrm>
+          <a:prstGeom prst="straightConnector1">
+            <a:avLst/>
+          </a:prstGeom>
+          <a:ln>
+            <a:tailEnd type="triangle"/>
+          </a:ln>
+        </p:spPr>
+        <p:style>
+          <a:lnRef idx="1">
+            <a:schemeClr val="accent1"/>
+          </a:lnRef>
+          <a:fillRef idx="0">
+            <a:schemeClr val="accent1"/>
+          </a:fillRef>
+          <a:effectRef idx="0">
+            <a:schemeClr val="accent1"/>
+          </a:effectRef>
+          <a:fontRef idx="minor">
+            <a:schemeClr val="tx1"/>
+          </a:fontRef>
+        </p:style>
+      </p:cxnSp>
+    </p:spTree>
+    <p:extLst>
+      <p:ext uri="{BB962C8B-B14F-4D97-AF65-F5344CB8AC3E}">
+        <p14:creationId xmlns:p14="http://schemas.microsoft.com/office/powerpoint/2010/main" val="40009734"/>
+      </p:ext>
+    </p:extLst>
+  </p:cSld>
+  <p:clrMapOvr>
+    <a:masterClrMapping/>
+  </p:clrMapOvr>
+</p:sld>
+</file>
+
 <file path=ppt/theme/theme1.xml><?xml version="1.0" encoding="utf-8"?>
 <a:theme xmlns:a="http://schemas.openxmlformats.org/drawingml/2006/main" name="Frame">
   <a:themeElements>

</xml_diff>